<commit_message>
Reorganize the files, minor updates to getting started.
</commit_message>
<xml_diff>
--- a/training/01-intro-commands/01-tstool-intro-commands.pptx
+++ b/training/01-intro-commands/01-tstool-intro-commands.pptx
@@ -4531,7 +4531,7 @@
             </a:pPr>
             <a:r>
               <a:rPr lang="en-US" kern="0" dirty="0" smtClean="0"/>
-              <a:t>Command files can also be edited with a text editor and can be created by other software, but be careful when mixing editing tools during an editing session because changes will reflect the tool that saves the changes.</a:t>
+              <a:t>Command files can also be edited with a text editor and can be created by other software, but be careful when mixing editing tools during an editing session because changes will reflect the tool that saves the changes last.</a:t>
             </a:r>
           </a:p>
         </p:txBody>
@@ -5659,22 +5659,11 @@
             </a:r>
             <a:r>
               <a:rPr lang="en-US" sz="2800" kern="0" dirty="0"/>
-              <a:t> folder under the software installation folder</a:t>
-            </a:r>
-          </a:p>
-          <a:p>
-            <a:pPr marL="1028700" lvl="1" indent="-457200">
-              <a:buSzPct val="150000"/>
-              <a:buFont typeface="Arial" panose="020B0604020202020204" pitchFamily="34" charset="0"/>
-              <a:buChar char="−"/>
-            </a:pPr>
-            <a:r>
-              <a:rPr lang="en-US" sz="2800" kern="0" dirty="0"/>
-              <a:t>Full use of TSTool requires access to the internet </a:t>
+              <a:t> folder under the software installation </a:t>
             </a:r>
             <a:r>
               <a:rPr lang="en-US" sz="2800" kern="0" dirty="0" smtClean="0"/>
-              <a:t>and may require installing databases and other software</a:t>
+              <a:t>folder</a:t>
             </a:r>
             <a:endParaRPr lang="en-US" sz="2800" kern="0" dirty="0"/>
           </a:p>

</xml_diff>